<commit_message>
Updated with week two content.
</commit_message>
<xml_diff>
--- a/FEWorkshop-Week1.pptx
+++ b/FEWorkshop-Week1.pptx
@@ -249,7 +249,7 @@
           <a:p>
             <a:fld id="{A8E03A04-0626-44D4-B6D6-43B9D98023FD}" type="datetimeFigureOut">
               <a:rPr lang="en-US" smtClean="0"/>
-              <a:t>10/4/16</a:t>
+              <a:t>10/6/16</a:t>
             </a:fld>
             <a:endParaRPr lang="en-US"/>
           </a:p>
@@ -8355,6 +8355,61 @@
           </a:prstGeom>
         </p:spPr>
       </p:pic>
+      <p:sp>
+        <p:nvSpPr>
+          <p:cNvPr id="5" name="TextBox 4"/>
+          <p:cNvSpPr txBox="1"/>
+          <p:nvPr/>
+        </p:nvSpPr>
+        <p:spPr>
+          <a:xfrm>
+            <a:off x="683173" y="5145843"/>
+            <a:ext cx="2686954" cy="369332"/>
+          </a:xfrm>
+          <a:prstGeom prst="rect">
+            <a:avLst/>
+          </a:prstGeom>
+          <a:noFill/>
+        </p:spPr>
+        <p:txBody>
+          <a:bodyPr wrap="none" rtlCol="0">
+            <a:spAutoFit/>
+          </a:bodyPr>
+          <a:lstStyle/>
+          <a:p>
+            <a:r>
+              <a:rPr lang="en-US" dirty="0" smtClean="0">
+                <a:solidFill>
+                  <a:schemeClr val="bg1"/>
+                </a:solidFill>
+                <a:latin typeface="DIN Alternate" charset="0"/>
+                <a:ea typeface="DIN Alternate" charset="0"/>
+                <a:cs typeface="DIN Alternate" charset="0"/>
+              </a:rPr>
+              <a:t>WEEK One</a:t>
+            </a:r>
+            <a:r>
+              <a:rPr lang="en-US" smtClean="0">
+                <a:solidFill>
+                  <a:schemeClr val="bg1"/>
+                </a:solidFill>
+                <a:latin typeface="DIN Alternate" charset="0"/>
+                <a:ea typeface="DIN Alternate" charset="0"/>
+                <a:cs typeface="DIN Alternate" charset="0"/>
+              </a:rPr>
+              <a:t>: HTML BASICS</a:t>
+            </a:r>
+            <a:endParaRPr lang="en-US" dirty="0">
+              <a:solidFill>
+                <a:schemeClr val="bg1"/>
+              </a:solidFill>
+              <a:latin typeface="DIN Alternate" charset="0"/>
+              <a:ea typeface="DIN Alternate" charset="0"/>
+              <a:cs typeface="DIN Alternate" charset="0"/>
+            </a:endParaRPr>
+          </a:p>
+        </p:txBody>
+      </p:sp>
     </p:spTree>
     <p:extLst>
       <p:ext uri="{BB962C8B-B14F-4D97-AF65-F5344CB8AC3E}">
@@ -11659,7 +11714,7 @@
         <p:spPr>
           <a:xfrm>
             <a:off x="685800" y="1589291"/>
-            <a:ext cx="10658959" cy="3323987"/>
+            <a:ext cx="10658959" cy="2677656"/>
           </a:xfrm>
           <a:prstGeom prst="rect">
             <a:avLst/>
@@ -11730,7 +11785,29 @@
                 <a:ea typeface="DIN Alternate" charset="0"/>
                 <a:cs typeface="DIN Alternate" charset="0"/>
               </a:rPr>
-              <a:t>Use the “week one” folder (available on Google Drive) example as a guide.</a:t>
+              <a:t>Use the “week one” folder (available on </a:t>
+            </a:r>
+            <a:r>
+              <a:rPr lang="en-US" sz="2800" dirty="0" err="1" smtClean="0">
+                <a:solidFill>
+                  <a:schemeClr val="bg1"/>
+                </a:solidFill>
+                <a:latin typeface="DIN Alternate" charset="0"/>
+                <a:ea typeface="DIN Alternate" charset="0"/>
+                <a:cs typeface="DIN Alternate" charset="0"/>
+              </a:rPr>
+              <a:t>Github</a:t>
+            </a:r>
+            <a:r>
+              <a:rPr lang="en-US" sz="2800" dirty="0" smtClean="0">
+                <a:solidFill>
+                  <a:schemeClr val="bg1"/>
+                </a:solidFill>
+                <a:latin typeface="DIN Alternate" charset="0"/>
+                <a:ea typeface="DIN Alternate" charset="0"/>
+                <a:cs typeface="DIN Alternate" charset="0"/>
+              </a:rPr>
+              <a:t>) example as a guide.</a:t>
             </a:r>
             <a:endParaRPr lang="en-US" sz="2800" dirty="0">
               <a:solidFill>
@@ -12493,29 +12570,7 @@
                 <a:ea typeface="DIN Alternate" charset="0"/>
                 <a:cs typeface="DIN Alternate" charset="0"/>
               </a:rPr>
-              <a:t>Intro (10 </a:t>
-            </a:r>
-            <a:r>
-              <a:rPr lang="en-US" sz="2800" dirty="0" smtClean="0">
-                <a:solidFill>
-                  <a:schemeClr val="bg1"/>
-                </a:solidFill>
-                <a:latin typeface="DIN Alternate" charset="0"/>
-                <a:ea typeface="DIN Alternate" charset="0"/>
-                <a:cs typeface="DIN Alternate" charset="0"/>
-              </a:rPr>
-              <a:t>mins</a:t>
-            </a:r>
-            <a:r>
-              <a:rPr lang="en-US" sz="2800" dirty="0" smtClean="0">
-                <a:solidFill>
-                  <a:schemeClr val="bg1"/>
-                </a:solidFill>
-                <a:latin typeface="DIN Alternate" charset="0"/>
-                <a:ea typeface="DIN Alternate" charset="0"/>
-                <a:cs typeface="DIN Alternate" charset="0"/>
-              </a:rPr>
-              <a:t>)</a:t>
+              <a:t>Intro (10 mins)</a:t>
             </a:r>
           </a:p>
           <a:p>
@@ -12597,14 +12652,6 @@
               </a:rPr>
               <a:t>Getting set up</a:t>
             </a:r>
-            <a:endParaRPr lang="en-US" sz="2800" dirty="0" smtClean="0">
-              <a:solidFill>
-                <a:schemeClr val="bg1"/>
-              </a:solidFill>
-              <a:latin typeface="DIN Alternate" charset="0"/>
-              <a:ea typeface="DIN Alternate" charset="0"/>
-              <a:cs typeface="DIN Alternate" charset="0"/>
-            </a:endParaRPr>
           </a:p>
           <a:p>
             <a:pPr marL="457200" indent="-457200">
@@ -12974,14 +13021,6 @@
               </a:rPr>
               <a:t>Chrome</a:t>
             </a:r>
-            <a:endParaRPr lang="en-US" sz="2800" dirty="0" smtClean="0">
-              <a:solidFill>
-                <a:schemeClr val="bg1"/>
-              </a:solidFill>
-              <a:latin typeface="DIN Alternate" charset="0"/>
-              <a:ea typeface="DIN Alternate" charset="0"/>
-              <a:cs typeface="DIN Alternate" charset="0"/>
-            </a:endParaRPr>
           </a:p>
           <a:p>
             <a:pPr marL="457200" indent="-457200">
@@ -13578,7 +13617,7 @@
         </p:nvSpPr>
         <p:spPr>
           <a:xfrm>
-            <a:off x="685800" y="1341318"/>
+            <a:off x="685800" y="1349631"/>
             <a:ext cx="10658959" cy="5262979"/>
           </a:xfrm>
           <a:prstGeom prst="rect">

</xml_diff>